<commit_message>
Fix typo of lukealk98's 4th material
</commit_message>
<xml_diff>
--- a/lukealk98/Seminar 4.pptx
+++ b/lukealk98/Seminar 4.pptx
@@ -231,7 +231,7 @@
           <a:p>
             <a:fld id="{F5FBCF86-1C97-C04D-8739-17CC13319695}" type="datetimeFigureOut">
               <a:rPr lang="en-GB" smtClean="0"/>
-              <a:t>06/08/2017</a:t>
+              <a:t>09/09/2017</a:t>
             </a:fld>
             <a:endParaRPr lang="en-GB"/>
           </a:p>
@@ -800,7 +800,7 @@
           <a:p>
             <a:fld id="{9AB3A824-1A51-4B26-AD58-A6D8E14F6C04}" type="datetimeFigureOut">
               <a:rPr lang="en-US" dirty="0"/>
-              <a:t>8/6/17</a:t>
+              <a:t>9/9/17</a:t>
             </a:fld>
             <a:endParaRPr lang="en-US" dirty="0"/>
           </a:p>
@@ -1134,7 +1134,7 @@
           <a:p>
             <a:fld id="{D857E33E-8B18-4087-B112-809917729534}" type="datetimeFigureOut">
               <a:rPr lang="en-US" dirty="0"/>
-              <a:t>8/6/17</a:t>
+              <a:t>9/9/17</a:t>
             </a:fld>
             <a:endParaRPr lang="en-US" dirty="0"/>
           </a:p>
@@ -1436,7 +1436,7 @@
           <a:p>
             <a:fld id="{D3FFE419-2371-464F-8239-3959401C3561}" type="datetimeFigureOut">
               <a:rPr lang="en-US" dirty="0"/>
-              <a:t>8/6/17</a:t>
+              <a:t>9/9/17</a:t>
             </a:fld>
             <a:endParaRPr lang="en-US" dirty="0"/>
           </a:p>
@@ -1683,7 +1683,7 @@
           <a:p>
             <a:fld id="{97D162C4-EDD9-4389-A98B-B87ECEA2A816}" type="datetimeFigureOut">
               <a:rPr lang="en-US" dirty="0"/>
-              <a:t>8/6/17</a:t>
+              <a:t>9/9/17</a:t>
             </a:fld>
             <a:endParaRPr lang="en-US" dirty="0"/>
           </a:p>
@@ -2090,7 +2090,7 @@
           <a:p>
             <a:fld id="{3E5059C3-6A89-4494-99FF-5A4D6FFD50EB}" type="datetimeFigureOut">
               <a:rPr lang="en-US" dirty="0"/>
-              <a:t>8/6/17</a:t>
+              <a:t>9/9/17</a:t>
             </a:fld>
             <a:endParaRPr lang="en-US" dirty="0"/>
           </a:p>
@@ -2404,7 +2404,7 @@
           <a:p>
             <a:fld id="{CA954B2F-12DE-47F5-8894-472B206D2E1E}" type="datetimeFigureOut">
               <a:rPr lang="en-US" dirty="0"/>
-              <a:t>8/6/17</a:t>
+              <a:t>9/9/17</a:t>
             </a:fld>
             <a:endParaRPr lang="en-US" dirty="0"/>
           </a:p>
@@ -2948,7 +2948,7 @@
           <a:p>
             <a:fld id="{3F30E46F-7819-4ACF-B48B-48222C2ACC88}" type="datetimeFigureOut">
               <a:rPr lang="en-US" dirty="0"/>
-              <a:t>8/6/17</a:t>
+              <a:t>9/9/17</a:t>
             </a:fld>
             <a:endParaRPr lang="en-US" dirty="0"/>
           </a:p>
@@ -3143,7 +3143,7 @@
           <a:p>
             <a:fld id="{1FAF3416-4057-4DAA-829D-4CA07428D088}" type="datetimeFigureOut">
               <a:rPr lang="en-US" dirty="0"/>
-              <a:t>8/6/17</a:t>
+              <a:t>9/9/17</a:t>
             </a:fld>
             <a:endParaRPr lang="en-US" dirty="0"/>
           </a:p>
@@ -3356,7 +3356,7 @@
           <a:p>
             <a:fld id="{921D9284-D300-4297-87F7-E791DCC15DB1}" type="datetimeFigureOut">
               <a:rPr lang="en-US" dirty="0"/>
-              <a:t>8/6/17</a:t>
+              <a:t>9/9/17</a:t>
             </a:fld>
             <a:endParaRPr lang="en-US" dirty="0"/>
           </a:p>
@@ -3725,7 +3725,7 @@
           <a:p>
             <a:fld id="{37D525BB-DA17-4BA0-B3C8-3AC3ABC827E6}" type="datetimeFigureOut">
               <a:rPr lang="en-US" dirty="0"/>
-              <a:t>8/6/17</a:t>
+              <a:t>9/9/17</a:t>
             </a:fld>
             <a:endParaRPr lang="en-US" dirty="0"/>
           </a:p>
@@ -4128,7 +4128,7 @@
           <a:p>
             <a:fld id="{B16C4C9A-3960-41CF-A4E9-2A8FB932454B}" type="datetimeFigureOut">
               <a:rPr lang="en-US" dirty="0"/>
-              <a:t>8/6/17</a:t>
+              <a:t>9/9/17</a:t>
             </a:fld>
             <a:endParaRPr lang="en-US" dirty="0"/>
           </a:p>
@@ -4466,7 +4466,7 @@
           <a:p>
             <a:fld id="{3CBC1C18-307B-4F68-A007-B5B542270E8D}" type="datetimeFigureOut">
               <a:rPr lang="en-US" dirty="0"/>
-              <a:t>8/6/17</a:t>
+              <a:t>9/9/17</a:t>
             </a:fld>
             <a:endParaRPr lang="en-US" dirty="0"/>
           </a:p>
@@ -5046,6 +5046,13 @@
   <p:clrMapOvr>
     <a:masterClrMapping/>
   </p:clrMapOvr>
+  <p:timing>
+    <p:tnLst>
+      <p:par>
+        <p:cTn id="1" dur="indefinite" restart="never" nodeType="tmRoot"/>
+      </p:par>
+    </p:tnLst>
+  </p:timing>
 </p:sld>
 </file>
 
@@ -8862,7 +8869,48 @@
                 </a:r>
                 <a:r>
                   <a:rPr lang="en-GB" dirty="0"/>
-                  <a:t>in O(L3) operations using the continued fractions algorithm</a:t>
+                  <a:t>in </a:t>
+                </a:r>
+                <a:r>
+                  <a:rPr lang="en-GB" dirty="0" smtClean="0"/>
+                  <a:t>O(</a:t>
+                </a:r>
+                <a14:m>
+                  <m:oMath xmlns:m="http://schemas.openxmlformats.org/officeDocument/2006/math">
+                    <m:sSup>
+                      <m:sSupPr>
+                        <m:ctrlPr>
+                          <a:rPr lang="en-GB" i="1" smtClean="0">
+                            <a:latin typeface="Cambria Math" charset="0"/>
+                          </a:rPr>
+                        </m:ctrlPr>
+                      </m:sSupPr>
+                      <m:e>
+                        <m:r>
+                          <a:rPr lang="en-US" b="0" i="1" smtClean="0">
+                            <a:latin typeface="Cambria Math" charset="0"/>
+                          </a:rPr>
+                          <m:t>𝐿</m:t>
+                        </m:r>
+                      </m:e>
+                      <m:sup>
+                        <m:r>
+                          <a:rPr lang="en-US" b="0" i="1" smtClean="0">
+                            <a:latin typeface="Cambria Math" charset="0"/>
+                          </a:rPr>
+                          <m:t>3</m:t>
+                        </m:r>
+                      </m:sup>
+                    </m:sSup>
+                  </m:oMath>
+                </a14:m>
+                <a:r>
+                  <a:rPr lang="en-GB" dirty="0" smtClean="0"/>
+                  <a:t>) </a:t>
+                </a:r>
+                <a:r>
+                  <a:rPr lang="en-GB" dirty="0"/>
+                  <a:t>operations using the continued fractions algorithm</a:t>
                 </a:r>
                 <a:r>
                   <a:rPr lang="en-GB" dirty="0" smtClean="0"/>
@@ -8906,7 +8954,7 @@
               <a:lstStyle/>
               <a:p>
                 <a:r>
-                  <a:rPr lang="en-GB">
+                  <a:rPr lang="en-US">
                     <a:noFill/>
                   </a:rPr>
                   <a:t> </a:t>
@@ -9065,8 +9113,8 @@
           </a:p>
         </p:txBody>
       </p:sp>
-      <mc:AlternateContent xmlns:mc="http://schemas.openxmlformats.org/markup-compatibility/2006" xmlns:a14="http://schemas.microsoft.com/office/drawing/2010/main">
-        <mc:Choice Requires="a14">
+      <mc:AlternateContent xmlns:mc="http://schemas.openxmlformats.org/markup-compatibility/2006">
+        <mc:Choice xmlns:a14="http://schemas.microsoft.com/office/drawing/2010/main" Requires="a14">
           <p:sp>
             <p:nvSpPr>
               <p:cNvPr id="3" name="Content Placeholder 2"/>
@@ -9079,7 +9127,9 @@
             </p:nvSpPr>
             <p:spPr/>
             <p:txBody>
-              <a:bodyPr/>
+              <a:bodyPr>
+                <a:normAutofit fontScale="92500"/>
+              </a:bodyPr>
               <a:lstStyle/>
               <a:p>
                 <a:r>
@@ -9246,6 +9296,101 @@
                   <a:rPr lang="en-GB" dirty="0" smtClean="0"/>
                   <a:t>Step 2. </a:t>
                 </a:r>
+                <a:r>
+                  <a:rPr lang="en-US" dirty="0" smtClean="0"/>
+                  <a:t>Show that randomly chosen y co-prime to N is quite likely to have an EVEN order, and </a:t>
+                </a:r>
+                <a14:m>
+                  <m:oMath xmlns:m="http://schemas.openxmlformats.org/officeDocument/2006/math">
+                    <m:sSup>
+                      <m:sSupPr>
+                        <m:ctrlPr>
+                          <a:rPr lang="en-US" i="1" smtClean="0">
+                            <a:latin typeface="Cambria Math" charset="0"/>
+                          </a:rPr>
+                        </m:ctrlPr>
+                      </m:sSupPr>
+                      <m:e>
+                        <m:r>
+                          <a:rPr lang="en-US" b="0" i="1" smtClean="0">
+                            <a:latin typeface="Cambria Math" charset="0"/>
+                          </a:rPr>
+                          <m:t>𝑦</m:t>
+                        </m:r>
+                      </m:e>
+                      <m:sup>
+                        <m:r>
+                          <a:rPr lang="en-US" b="0" i="1" smtClean="0">
+                            <a:latin typeface="Cambria Math" charset="0"/>
+                          </a:rPr>
+                          <m:t>𝑟</m:t>
+                        </m:r>
+                        <m:r>
+                          <a:rPr lang="en-US" b="0" i="1" smtClean="0">
+                            <a:latin typeface="Cambria Math" charset="0"/>
+                          </a:rPr>
+                          <m:t>/2</m:t>
+                        </m:r>
+                      </m:sup>
+                    </m:sSup>
+                    <m:r>
+                      <a:rPr lang="en-US" i="1" smtClean="0">
+                        <a:latin typeface="Cambria Math" charset="0"/>
+                        <a:ea typeface="Cambria Math" charset="0"/>
+                        <a:cs typeface="Cambria Math" charset="0"/>
+                      </a:rPr>
+                      <m:t>≠±</m:t>
+                    </m:r>
+                    <m:r>
+                      <a:rPr lang="en-US" b="0" i="1" smtClean="0">
+                        <a:latin typeface="Cambria Math" charset="0"/>
+                        <a:ea typeface="Cambria Math" charset="0"/>
+                        <a:cs typeface="Cambria Math" charset="0"/>
+                      </a:rPr>
+                      <m:t>1 </m:t>
+                    </m:r>
+                    <m:d>
+                      <m:dPr>
+                        <m:ctrlPr>
+                          <a:rPr lang="en-US" b="0" i="1" smtClean="0">
+                            <a:latin typeface="Cambria Math" charset="0"/>
+                            <a:ea typeface="Cambria Math" charset="0"/>
+                            <a:cs typeface="Cambria Math" charset="0"/>
+                          </a:rPr>
+                        </m:ctrlPr>
+                      </m:dPr>
+                      <m:e>
+                        <m:r>
+                          <m:rPr>
+                            <m:sty m:val="p"/>
+                          </m:rPr>
+                          <a:rPr lang="en-US" b="0" i="0" smtClean="0">
+                            <a:latin typeface="Cambria Math" charset="0"/>
+                            <a:ea typeface="Cambria Math" charset="0"/>
+                            <a:cs typeface="Cambria Math" charset="0"/>
+                          </a:rPr>
+                          <m:t>mod</m:t>
+                        </m:r>
+                        <m:r>
+                          <a:rPr lang="en-US" b="0" i="1" smtClean="0">
+                            <a:latin typeface="Cambria Math" charset="0"/>
+                            <a:ea typeface="Cambria Math" charset="0"/>
+                            <a:cs typeface="Cambria Math" charset="0"/>
+                          </a:rPr>
+                          <m:t> </m:t>
+                        </m:r>
+                        <m:r>
+                          <a:rPr lang="en-US" b="0" i="1" smtClean="0">
+                            <a:latin typeface="Cambria Math" charset="0"/>
+                            <a:ea typeface="Cambria Math" charset="0"/>
+                            <a:cs typeface="Cambria Math" charset="0"/>
+                          </a:rPr>
+                          <m:t>𝑁</m:t>
+                        </m:r>
+                      </m:e>
+                    </m:d>
+                  </m:oMath>
+                </a14:m>
                 <a:endParaRPr lang="en-GB" dirty="0"/>
               </a:p>
               <a:p>
@@ -9254,7 +9399,7 @@
             </p:txBody>
           </p:sp>
         </mc:Choice>
-        <mc:Fallback xmlns="">
+        <mc:Fallback>
           <p:sp>
             <p:nvSpPr>
               <p:cNvPr id="3" name="Content Placeholder 2"/>
@@ -9269,7 +9414,7 @@
               <a:blipFill rotWithShape="0">
                 <a:blip r:embed="rId2"/>
                 <a:stretch>
-                  <a:fillRect l="-547" t="-4733"/>
+                  <a:fillRect l="-469" t="-2901" r="-1095" b="-1221"/>
                 </a:stretch>
               </a:blipFill>
             </p:spPr>
@@ -9278,7 +9423,7 @@
               <a:lstStyle/>
               <a:p>
                 <a:r>
-                  <a:rPr lang="en-GB">
+                  <a:rPr lang="en-US">
                     <a:noFill/>
                   </a:rPr>
                   <a:t> </a:t>
@@ -9348,8 +9493,8 @@
           </a:p>
         </p:txBody>
       </p:sp>
-      <mc:AlternateContent xmlns:mc="http://schemas.openxmlformats.org/markup-compatibility/2006">
-        <mc:Choice xmlns:a14="http://schemas.microsoft.com/office/drawing/2010/main" Requires="a14">
+      <mc:AlternateContent xmlns:mc="http://schemas.openxmlformats.org/markup-compatibility/2006" xmlns:a14="http://schemas.microsoft.com/office/drawing/2010/main">
+        <mc:Choice Requires="a14">
           <p:sp>
             <p:nvSpPr>
               <p:cNvPr id="3" name="Content Placeholder 2"/>
@@ -9523,11 +9668,7 @@
               <a:p>
                 <a:r>
                   <a:rPr lang="en-GB" dirty="0" smtClean="0"/>
-                  <a:t>Theorem 2. </a:t>
-                </a:r>
-                <a:r>
-                  <a:rPr lang="en-GB" dirty="0" smtClean="0"/>
-                  <a:t>Suppose </a:t>
+                  <a:t>Theorem 2. Suppose </a:t>
                 </a:r>
                 <a14:m>
                   <m:oMath xmlns:m="http://schemas.openxmlformats.org/officeDocument/2006/math">
@@ -9948,7 +10089,7 @@
             </p:txBody>
           </p:sp>
         </mc:Choice>
-        <mc:Fallback>
+        <mc:Fallback xmlns="">
           <p:sp>
             <p:nvSpPr>
               <p:cNvPr id="3" name="Content Placeholder 2"/>
@@ -10282,7 +10423,7 @@
                     <m:d>
                       <m:dPr>
                         <m:ctrlPr>
-                          <a:rPr lang="en-GB" b="0" i="0" smtClean="0">
+                          <a:rPr lang="en-GB" b="0" i="1" smtClean="0">
                             <a:latin typeface="Cambria Math" charset="0"/>
                           </a:rPr>
                         </m:ctrlPr>
@@ -10429,20 +10570,18 @@
                           </m:sup>
                         </m:sSup>
                         <m:r>
+                          <a:rPr lang="en-US" b="0" i="1" smtClean="0">
+                            <a:latin typeface="Cambria Math" charset="0"/>
+                          </a:rPr>
+                          <m:t>+</m:t>
+                        </m:r>
+                        <m:r>
                           <a:rPr lang="en-GB" i="1">
                             <a:latin typeface="Cambria Math" charset="0"/>
                             <a:ea typeface="Cambria Math" charset="0"/>
                             <a:cs typeface="Cambria Math" charset="0"/>
                           </a:rPr>
-                          <m:t>−1</m:t>
-                        </m:r>
-                        <m:r>
-                          <a:rPr lang="en-GB" i="1">
-                            <a:latin typeface="Cambria Math" charset="0"/>
-                            <a:ea typeface="Cambria Math" charset="0"/>
-                            <a:cs typeface="Cambria Math" charset="0"/>
-                          </a:rPr>
-                          <m:t>, </m:t>
+                          <m:t>1, </m:t>
                         </m:r>
                         <m:r>
                           <a:rPr lang="en-GB" i="1">
@@ -10492,7 +10631,7 @@
               <a:lstStyle/>
               <a:p>
                 <a:r>
-                  <a:rPr lang="en-GB">
+                  <a:rPr lang="en-US">
                     <a:noFill/>
                   </a:rPr>
                   <a:t> </a:t>
@@ -10958,15 +11097,7 @@
                             <a:ea typeface="Cambria Math" charset="0"/>
                             <a:cs typeface="Cambria Math" charset="0"/>
                           </a:rPr>
-                          <m:t>−1</m:t>
-                        </m:r>
-                        <m:r>
-                          <a:rPr lang="en-GB" i="1">
-                            <a:latin typeface="Cambria Math" charset="0"/>
-                            <a:ea typeface="Cambria Math" charset="0"/>
-                            <a:cs typeface="Cambria Math" charset="0"/>
-                          </a:rPr>
-                          <m:t>, </m:t>
+                          <m:t>−1, </m:t>
                         </m:r>
                         <m:r>
                           <a:rPr lang="en-GB" i="1">
@@ -11049,12 +11180,20 @@
                           </m:sup>
                         </m:sSup>
                         <m:r>
-                          <a:rPr lang="en-GB" i="1">
+                          <a:rPr lang="en-US" b="0" i="1" smtClean="0">
                             <a:latin typeface="Cambria Math" charset="0"/>
                             <a:ea typeface="Cambria Math" charset="0"/>
                             <a:cs typeface="Cambria Math" charset="0"/>
                           </a:rPr>
-                          <m:t>−1, </m:t>
+                          <m:t>+</m:t>
+                        </m:r>
+                        <m:r>
+                          <a:rPr lang="en-GB" i="1">
+                            <a:latin typeface="Cambria Math" charset="0"/>
+                            <a:ea typeface="Cambria Math" charset="0"/>
+                            <a:cs typeface="Cambria Math" charset="0"/>
+                          </a:rPr>
+                          <m:t>1, </m:t>
                         </m:r>
                         <m:r>
                           <a:rPr lang="en-GB" i="1">
@@ -11092,7 +11231,7 @@
               <a:blipFill rotWithShape="0">
                 <a:blip r:embed="rId2"/>
                 <a:stretch>
-                  <a:fillRect l="-547" b="-2290"/>
+                  <a:fillRect l="-547" b="-2595"/>
                 </a:stretch>
               </a:blipFill>
             </p:spPr>
@@ -11101,7 +11240,7 @@
               <a:lstStyle/>
               <a:p>
                 <a:r>
-                  <a:rPr lang="en-GB">
+                  <a:rPr lang="en-US">
                     <a:noFill/>
                   </a:rPr>
                   <a:t> </a:t>
@@ -11121,6 +11260,13 @@
   <p:clrMapOvr>
     <a:masterClrMapping/>
   </p:clrMapOvr>
+  <p:timing>
+    <p:tnLst>
+      <p:par>
+        <p:cTn id="1" dur="indefinite" restart="never" nodeType="tmRoot"/>
+      </p:par>
+    </p:tnLst>
+  </p:timing>
 </p:sld>
 </file>
 
@@ -11519,15 +11665,7 @@
           <a:p>
             <a:r>
               <a:rPr lang="en-GB" dirty="0" smtClean="0"/>
-              <a:t>See these </a:t>
-            </a:r>
-            <a:r>
-              <a:rPr lang="en-GB" dirty="0" smtClean="0"/>
-              <a:t>three </a:t>
-            </a:r>
-            <a:r>
-              <a:rPr lang="en-GB" dirty="0" smtClean="0"/>
-              <a:t>notes to understand the algorithms better.</a:t>
+              <a:t>See these three notes to understand the algorithms better.</a:t>
             </a:r>
           </a:p>
           <a:p>
@@ -11828,6 +11966,13 @@
   <p:clrMapOvr>
     <a:masterClrMapping/>
   </p:clrMapOvr>
+  <p:timing>
+    <p:tnLst>
+      <p:par>
+        <p:cTn id="1" dur="indefinite" restart="never" nodeType="tmRoot"/>
+      </p:par>
+    </p:tnLst>
+  </p:timing>
 </p:sld>
 </file>
 
@@ -11910,6 +12055,13 @@
   <p:clrMapOvr>
     <a:masterClrMapping/>
   </p:clrMapOvr>
+  <p:timing>
+    <p:tnLst>
+      <p:par>
+        <p:cTn id="1" dur="indefinite" restart="never" nodeType="tmRoot"/>
+      </p:par>
+    </p:tnLst>
+  </p:timing>
 </p:sld>
 </file>
 
@@ -11953,8 +12105,8 @@
           </a:p>
         </p:txBody>
       </p:sp>
-      <mc:AlternateContent xmlns:mc="http://schemas.openxmlformats.org/markup-compatibility/2006">
-        <mc:Choice xmlns:a14="http://schemas.microsoft.com/office/drawing/2010/main" Requires="a14">
+      <mc:AlternateContent xmlns:mc="http://schemas.openxmlformats.org/markup-compatibility/2006" xmlns:a14="http://schemas.microsoft.com/office/drawing/2010/main">
+        <mc:Choice Requires="a14">
           <p:sp>
             <p:nvSpPr>
               <p:cNvPr id="3" name="Content Placeholder 2"/>
@@ -12236,7 +12388,7 @@
             </p:txBody>
           </p:sp>
         </mc:Choice>
-        <mc:Fallback>
+        <mc:Fallback xmlns="">
           <p:sp>
             <p:nvSpPr>
               <p:cNvPr id="3" name="Content Placeholder 2"/>
@@ -12280,6 +12432,13 @@
   <p:clrMapOvr>
     <a:masterClrMapping/>
   </p:clrMapOvr>
+  <p:timing>
+    <p:tnLst>
+      <p:par>
+        <p:cTn id="1" dur="indefinite" restart="never" nodeType="tmRoot"/>
+      </p:par>
+    </p:tnLst>
+  </p:timing>
 </p:sld>
 </file>
 
@@ -12392,6 +12551,13 @@
   <p:clrMapOvr>
     <a:masterClrMapping/>
   </p:clrMapOvr>
+  <p:timing>
+    <p:tnLst>
+      <p:par>
+        <p:cTn id="1" dur="indefinite" restart="never" nodeType="tmRoot"/>
+      </p:par>
+    </p:tnLst>
+  </p:timing>
 </p:sld>
 </file>
 
@@ -12480,7 +12646,6 @@
               <a:rPr lang="en-GB" dirty="0"/>
               <a:t>. </a:t>
             </a:r>
-            <a:endParaRPr lang="en-GB" dirty="0"/>
           </a:p>
           <a:p>
             <a:r>
@@ -12503,7 +12668,6 @@
               <a:rPr lang="en-GB" dirty="0"/>
               <a:t>(g)⟩, for g ∈ G, h ∈ X, and ⊕ an appropriately chosen binary operation on X, find a generating set for K. </a:t>
             </a:r>
-            <a:endParaRPr lang="en-GB" dirty="0"/>
           </a:p>
         </p:txBody>
       </p:sp>
@@ -12517,6 +12681,13 @@
   <p:clrMapOvr>
     <a:masterClrMapping/>
   </p:clrMapOvr>
+  <p:timing>
+    <p:tnLst>
+      <p:par>
+        <p:cTn id="1" dur="indefinite" restart="never" nodeType="tmRoot"/>
+      </p:par>
+    </p:tnLst>
+  </p:timing>
 </p:sld>
 </file>
 
@@ -12605,6 +12776,13 @@
   <p:clrMapOvr>
     <a:masterClrMapping/>
   </p:clrMapOvr>
+  <p:timing>
+    <p:tnLst>
+      <p:par>
+        <p:cTn id="1" dur="indefinite" restart="never" nodeType="tmRoot"/>
+      </p:par>
+    </p:tnLst>
+  </p:timing>
 </p:sld>
 </file>
 

</xml_diff>